<commit_message>
Update Presentazione TedxTok(parte 4).pptx
</commit_message>
<xml_diff>
--- a/Parte 4/Presentazione TedxTok(parte 4).pptx
+++ b/Parte 4/Presentazione TedxTok(parte 4).pptx
@@ -16003,11 +16003,253 @@
               </a:rPr>
               <a:t>TedxTok</a:t>
             </a:r>
-            <a:endParaRPr lang="it-IT" sz="3200" dirty="0">
-              <a:solidFill>
-                <a:schemeClr val="bg1"/>
-              </a:solidFill>
-            </a:endParaRPr>
+            <a:r>
+              <a:rPr lang="it-IT" sz="3200" dirty="0">
+                <a:solidFill>
+                  <a:schemeClr val="bg1"/>
+                </a:solidFill>
+              </a:rPr>
+              <a:t> (</a:t>
+            </a:r>
+            <a:r>
+              <a:rPr lang="it-IT" sz="3200" dirty="0" err="1">
+                <a:solidFill>
+                  <a:schemeClr val="bg1"/>
+                </a:solidFill>
+              </a:rPr>
+              <a:t>main.dart</a:t>
+            </a:r>
+            <a:r>
+              <a:rPr lang="it-IT" sz="3200" dirty="0">
+                <a:solidFill>
+                  <a:schemeClr val="bg1"/>
+                </a:solidFill>
+              </a:rPr>
+              <a:t>)</a:t>
+            </a:r>
+          </a:p>
+        </p:txBody>
+      </p:sp>
+      <p:pic>
+        <p:nvPicPr>
+          <p:cNvPr id="3" name="Immagine 2" descr="Immagine che contiene testo, schermata&#10;&#10;Descrizione generata automaticamente">
+            <a:extLst>
+              <a:ext uri="{FF2B5EF4-FFF2-40B4-BE49-F238E27FC236}">
+                <a16:creationId xmlns:a16="http://schemas.microsoft.com/office/drawing/2014/main" id="{3875BA58-42DE-6291-378D-8657E45223E8}"/>
+              </a:ext>
+            </a:extLst>
+          </p:cNvPr>
+          <p:cNvPicPr>
+            <a:picLocks noChangeAspect="1"/>
+          </p:cNvPicPr>
+          <p:nvPr/>
+        </p:nvPicPr>
+        <p:blipFill>
+          <a:blip r:embed="rId3"/>
+          <a:stretch>
+            <a:fillRect/>
+          </a:stretch>
+        </p:blipFill>
+        <p:spPr>
+          <a:xfrm>
+            <a:off x="7556227" y="2696669"/>
+            <a:ext cx="4434144" cy="3825922"/>
+          </a:xfrm>
+          <a:prstGeom prst="rect">
+            <a:avLst/>
+          </a:prstGeom>
+        </p:spPr>
+      </p:pic>
+      <p:pic>
+        <p:nvPicPr>
+          <p:cNvPr id="6" name="Immagine 5" descr="Immagine che contiene testo, schermata, software, schermo&#10;&#10;Descrizione generata automaticamente">
+            <a:extLst>
+              <a:ext uri="{FF2B5EF4-FFF2-40B4-BE49-F238E27FC236}">
+                <a16:creationId xmlns:a16="http://schemas.microsoft.com/office/drawing/2014/main" id="{4D78179A-343B-EB3B-08B4-50A1D0E47084}"/>
+              </a:ext>
+            </a:extLst>
+          </p:cNvPr>
+          <p:cNvPicPr>
+            <a:picLocks noChangeAspect="1"/>
+          </p:cNvPicPr>
+          <p:nvPr/>
+        </p:nvPicPr>
+        <p:blipFill>
+          <a:blip r:embed="rId4"/>
+          <a:stretch>
+            <a:fillRect/>
+          </a:stretch>
+        </p:blipFill>
+        <p:spPr>
+          <a:xfrm>
+            <a:off x="334078" y="2333826"/>
+            <a:ext cx="3732027" cy="4188765"/>
+          </a:xfrm>
+          <a:prstGeom prst="rect">
+            <a:avLst/>
+          </a:prstGeom>
+        </p:spPr>
+      </p:pic>
+      <p:pic>
+        <p:nvPicPr>
+          <p:cNvPr id="8" name="Immagine 7" descr="Immagine che contiene testo, schermata, software&#10;&#10;Descrizione generata automaticamente">
+            <a:extLst>
+              <a:ext uri="{FF2B5EF4-FFF2-40B4-BE49-F238E27FC236}">
+                <a16:creationId xmlns:a16="http://schemas.microsoft.com/office/drawing/2014/main" id="{76EC844D-CFEB-1BF3-0FF9-BBFB42B28DAF}"/>
+              </a:ext>
+            </a:extLst>
+          </p:cNvPr>
+          <p:cNvPicPr>
+            <a:picLocks noChangeAspect="1"/>
+          </p:cNvPicPr>
+          <p:nvPr/>
+        </p:nvPicPr>
+        <p:blipFill>
+          <a:blip r:embed="rId5"/>
+          <a:stretch>
+            <a:fillRect/>
+          </a:stretch>
+        </p:blipFill>
+        <p:spPr>
+          <a:xfrm>
+            <a:off x="4284609" y="1699414"/>
+            <a:ext cx="2970561" cy="4967269"/>
+          </a:xfrm>
+          <a:prstGeom prst="rect">
+            <a:avLst/>
+          </a:prstGeom>
+        </p:spPr>
+      </p:pic>
+      <p:sp>
+        <p:nvSpPr>
+          <p:cNvPr id="10" name="CasellaDiTesto 9">
+            <a:extLst>
+              <a:ext uri="{FF2B5EF4-FFF2-40B4-BE49-F238E27FC236}">
+                <a16:creationId xmlns:a16="http://schemas.microsoft.com/office/drawing/2014/main" id="{53830DEF-6AB7-2F65-AF23-6506EE8D3411}"/>
+              </a:ext>
+            </a:extLst>
+          </p:cNvPr>
+          <p:cNvSpPr txBox="1"/>
+          <p:nvPr/>
+        </p:nvSpPr>
+        <p:spPr>
+          <a:xfrm>
+            <a:off x="334078" y="2026049"/>
+            <a:ext cx="3617619" cy="307777"/>
+          </a:xfrm>
+          <a:prstGeom prst="rect">
+            <a:avLst/>
+          </a:prstGeom>
+          <a:noFill/>
+        </p:spPr>
+        <p:txBody>
+          <a:bodyPr wrap="square" rtlCol="0">
+            <a:spAutoFit/>
+          </a:bodyPr>
+          <a:lstStyle/>
+          <a:p>
+            <a:r>
+              <a:rPr lang="it-IT" dirty="0">
+                <a:solidFill>
+                  <a:schemeClr val="bg1"/>
+                </a:solidFill>
+              </a:rPr>
+              <a:t>Viene creata la lista dei talk da selezionare</a:t>
+            </a:r>
+          </a:p>
+        </p:txBody>
+      </p:sp>
+      <p:sp>
+        <p:nvSpPr>
+          <p:cNvPr id="11" name="CasellaDiTesto 10">
+            <a:extLst>
+              <a:ext uri="{FF2B5EF4-FFF2-40B4-BE49-F238E27FC236}">
+                <a16:creationId xmlns:a16="http://schemas.microsoft.com/office/drawing/2014/main" id="{ECD4A667-2555-7BFF-0F45-C73DE8301EAB}"/>
+              </a:ext>
+            </a:extLst>
+          </p:cNvPr>
+          <p:cNvSpPr txBox="1"/>
+          <p:nvPr/>
+        </p:nvSpPr>
+        <p:spPr>
+          <a:xfrm>
+            <a:off x="7907285" y="1874083"/>
+            <a:ext cx="3732027" cy="738664"/>
+          </a:xfrm>
+          <a:prstGeom prst="rect">
+            <a:avLst/>
+          </a:prstGeom>
+          <a:noFill/>
+        </p:spPr>
+        <p:txBody>
+          <a:bodyPr wrap="square" rtlCol="0">
+            <a:spAutoFit/>
+          </a:bodyPr>
+          <a:lstStyle/>
+          <a:p>
+            <a:r>
+              <a:rPr lang="it-IT" dirty="0">
+                <a:solidFill>
+                  <a:schemeClr val="bg1"/>
+                </a:solidFill>
+              </a:rPr>
+              <a:t>Bottone che permette la navigazione alla seconda pagina, prendendo i tag selezionati dall’utente</a:t>
+            </a:r>
+          </a:p>
+        </p:txBody>
+      </p:sp>
+      <p:sp>
+        <p:nvSpPr>
+          <p:cNvPr id="12" name="CasellaDiTesto 11">
+            <a:extLst>
+              <a:ext uri="{FF2B5EF4-FFF2-40B4-BE49-F238E27FC236}">
+                <a16:creationId xmlns:a16="http://schemas.microsoft.com/office/drawing/2014/main" id="{3262399C-FA9D-A6DC-5537-98E7176A8643}"/>
+              </a:ext>
+            </a:extLst>
+          </p:cNvPr>
+          <p:cNvSpPr txBox="1"/>
+          <p:nvPr/>
+        </p:nvSpPr>
+        <p:spPr>
+          <a:xfrm>
+            <a:off x="4452215" y="1062318"/>
+            <a:ext cx="3913095" cy="523220"/>
+          </a:xfrm>
+          <a:prstGeom prst="rect">
+            <a:avLst/>
+          </a:prstGeom>
+          <a:noFill/>
+        </p:spPr>
+        <p:txBody>
+          <a:bodyPr wrap="square" rtlCol="0">
+            <a:spAutoFit/>
+          </a:bodyPr>
+          <a:lstStyle/>
+          <a:p>
+            <a:r>
+              <a:rPr lang="it-IT" dirty="0">
+                <a:solidFill>
+                  <a:schemeClr val="bg1"/>
+                </a:solidFill>
+              </a:rPr>
+              <a:t>Creazione della </a:t>
+            </a:r>
+            <a:r>
+              <a:rPr lang="it-IT" dirty="0" err="1">
+                <a:solidFill>
+                  <a:schemeClr val="bg1"/>
+                </a:solidFill>
+              </a:rPr>
+              <a:t>LIstView</a:t>
+            </a:r>
+            <a:r>
+              <a:rPr lang="it-IT" dirty="0">
+                <a:solidFill>
+                  <a:schemeClr val="bg1"/>
+                </a:solidFill>
+              </a:rPr>
+              <a:t> contenente i tag e raccolta dei tag selezionati</a:t>
+            </a:r>
           </a:p>
         </p:txBody>
       </p:sp>
@@ -16055,8 +16297,8 @@
         </p:nvSpPr>
         <p:spPr>
           <a:xfrm>
-            <a:off x="2860272" y="363667"/>
-            <a:ext cx="6831106" cy="584775"/>
+            <a:off x="2382600" y="363667"/>
+            <a:ext cx="8467370" cy="584775"/>
           </a:xfrm>
           <a:prstGeom prst="rect">
             <a:avLst/>
@@ -16085,14 +16327,230 @@
               </a:rPr>
               <a:t>TedxTok</a:t>
             </a:r>
-            <a:endParaRPr lang="it-IT" sz="3200" dirty="0">
-              <a:solidFill>
-                <a:schemeClr val="bg1"/>
-              </a:solidFill>
-            </a:endParaRPr>
+            <a:r>
+              <a:rPr lang="it-IT" sz="3200" dirty="0">
+                <a:solidFill>
+                  <a:schemeClr val="bg1"/>
+                </a:solidFill>
+              </a:rPr>
+              <a:t>(</a:t>
+            </a:r>
+            <a:r>
+              <a:rPr lang="it-IT" sz="3200" dirty="0" err="1">
+                <a:solidFill>
+                  <a:schemeClr val="bg1"/>
+                </a:solidFill>
+              </a:rPr>
+              <a:t>SecondPage.dart</a:t>
+            </a:r>
+            <a:r>
+              <a:rPr lang="it-IT" sz="3200" dirty="0">
+                <a:solidFill>
+                  <a:schemeClr val="bg1"/>
+                </a:solidFill>
+              </a:rPr>
+              <a:t>)</a:t>
+            </a:r>
           </a:p>
         </p:txBody>
       </p:sp>
+      <p:pic>
+        <p:nvPicPr>
+          <p:cNvPr id="3" name="Immagine 2" descr="Immagine che contiene testo, schermata&#10;&#10;Descrizione generata automaticamente">
+            <a:extLst>
+              <a:ext uri="{FF2B5EF4-FFF2-40B4-BE49-F238E27FC236}">
+                <a16:creationId xmlns:a16="http://schemas.microsoft.com/office/drawing/2014/main" id="{00194747-E6FA-9067-1985-B1C9F89D8ABF}"/>
+              </a:ext>
+            </a:extLst>
+          </p:cNvPr>
+          <p:cNvPicPr>
+            <a:picLocks noChangeAspect="1"/>
+          </p:cNvPicPr>
+          <p:nvPr/>
+        </p:nvPicPr>
+        <p:blipFill>
+          <a:blip r:embed="rId3"/>
+          <a:stretch>
+            <a:fillRect/>
+          </a:stretch>
+        </p:blipFill>
+        <p:spPr>
+          <a:xfrm>
+            <a:off x="843950" y="1970375"/>
+            <a:ext cx="3077299" cy="4653196"/>
+          </a:xfrm>
+          <a:prstGeom prst="rect">
+            <a:avLst/>
+          </a:prstGeom>
+        </p:spPr>
+      </p:pic>
+      <p:sp>
+        <p:nvSpPr>
+          <p:cNvPr id="5" name="CasellaDiTesto 4">
+            <a:extLst>
+              <a:ext uri="{FF2B5EF4-FFF2-40B4-BE49-F238E27FC236}">
+                <a16:creationId xmlns:a16="http://schemas.microsoft.com/office/drawing/2014/main" id="{24B246BB-0A5D-31AF-7AC8-4E81CAC1C3F4}"/>
+              </a:ext>
+            </a:extLst>
+          </p:cNvPr>
+          <p:cNvSpPr txBox="1"/>
+          <p:nvPr/>
+        </p:nvSpPr>
+        <p:spPr>
+          <a:xfrm>
+            <a:off x="843950" y="1090076"/>
+            <a:ext cx="3179928" cy="738664"/>
+          </a:xfrm>
+          <a:prstGeom prst="rect">
+            <a:avLst/>
+          </a:prstGeom>
+          <a:noFill/>
+        </p:spPr>
+        <p:txBody>
+          <a:bodyPr wrap="square" rtlCol="0">
+            <a:spAutoFit/>
+          </a:bodyPr>
+          <a:lstStyle/>
+          <a:p>
+            <a:r>
+              <a:rPr lang="it-IT" dirty="0">
+                <a:solidFill>
+                  <a:schemeClr val="bg1"/>
+                </a:solidFill>
+              </a:rPr>
+              <a:t>Abilita lo scorrimento verticale e crea la pagina HTML per visualizzare il video</a:t>
+            </a:r>
+          </a:p>
+        </p:txBody>
+      </p:sp>
+      <p:pic>
+        <p:nvPicPr>
+          <p:cNvPr id="7" name="Immagine 6" descr="Immagine che contiene testo, schermata&#10;&#10;Descrizione generata automaticamente">
+            <a:extLst>
+              <a:ext uri="{FF2B5EF4-FFF2-40B4-BE49-F238E27FC236}">
+                <a16:creationId xmlns:a16="http://schemas.microsoft.com/office/drawing/2014/main" id="{D49FDEF1-8915-09BB-7B97-486E71DF511A}"/>
+              </a:ext>
+            </a:extLst>
+          </p:cNvPr>
+          <p:cNvPicPr>
+            <a:picLocks noChangeAspect="1"/>
+          </p:cNvPicPr>
+          <p:nvPr/>
+        </p:nvPicPr>
+        <p:blipFill rotWithShape="1">
+          <a:blip r:embed="rId4"/>
+          <a:srcRect l="17405" r="467" b="7930"/>
+          <a:stretch/>
+        </p:blipFill>
+        <p:spPr>
+          <a:xfrm>
+            <a:off x="4152554" y="1828740"/>
+            <a:ext cx="3376552" cy="4801283"/>
+          </a:xfrm>
+          <a:prstGeom prst="rect">
+            <a:avLst/>
+          </a:prstGeom>
+        </p:spPr>
+      </p:pic>
+      <p:pic>
+        <p:nvPicPr>
+          <p:cNvPr id="9" name="Immagine 8" descr="Immagine che contiene testo, schermata&#10;&#10;Descrizione generata automaticamente">
+            <a:extLst>
+              <a:ext uri="{FF2B5EF4-FFF2-40B4-BE49-F238E27FC236}">
+                <a16:creationId xmlns:a16="http://schemas.microsoft.com/office/drawing/2014/main" id="{8FC8EA70-6BA9-4F8E-2D65-A5048DAB3178}"/>
+              </a:ext>
+            </a:extLst>
+          </p:cNvPr>
+          <p:cNvPicPr>
+            <a:picLocks noChangeAspect="1"/>
+          </p:cNvPicPr>
+          <p:nvPr/>
+        </p:nvPicPr>
+        <p:blipFill>
+          <a:blip r:embed="rId5"/>
+          <a:stretch>
+            <a:fillRect/>
+          </a:stretch>
+        </p:blipFill>
+        <p:spPr>
+          <a:xfrm>
+            <a:off x="7760412" y="1970375"/>
+            <a:ext cx="3976662" cy="4753885"/>
+          </a:xfrm>
+          <a:prstGeom prst="rect">
+            <a:avLst/>
+          </a:prstGeom>
+        </p:spPr>
+      </p:pic>
+      <p:sp>
+        <p:nvSpPr>
+          <p:cNvPr id="10" name="CasellaDiTesto 9">
+            <a:extLst>
+              <a:ext uri="{FF2B5EF4-FFF2-40B4-BE49-F238E27FC236}">
+                <a16:creationId xmlns:a16="http://schemas.microsoft.com/office/drawing/2014/main" id="{C1956247-789D-68CD-6D23-52971FA1CCDE}"/>
+              </a:ext>
+            </a:extLst>
+          </p:cNvPr>
+          <p:cNvSpPr txBox="1"/>
+          <p:nvPr/>
+        </p:nvSpPr>
+        <p:spPr>
+          <a:xfrm>
+            <a:off x="4907267" y="1138185"/>
+            <a:ext cx="4167570" cy="307777"/>
+          </a:xfrm>
+          <a:prstGeom prst="rect">
+            <a:avLst/>
+          </a:prstGeom>
+          <a:noFill/>
+        </p:spPr>
+        <p:txBody>
+          <a:bodyPr wrap="square" rtlCol="0">
+            <a:spAutoFit/>
+          </a:bodyPr>
+          <a:lstStyle/>
+          <a:p>
+            <a:r>
+              <a:rPr lang="it-IT" dirty="0">
+                <a:solidFill>
+                  <a:schemeClr val="bg1"/>
+                </a:solidFill>
+              </a:rPr>
+              <a:t>Inizializzazione dell’API e raccolta dei relativi dati</a:t>
+            </a:r>
+          </a:p>
+        </p:txBody>
+      </p:sp>
+      <p:pic>
+        <p:nvPicPr>
+          <p:cNvPr id="12" name="Immagine 11">
+            <a:extLst>
+              <a:ext uri="{FF2B5EF4-FFF2-40B4-BE49-F238E27FC236}">
+                <a16:creationId xmlns:a16="http://schemas.microsoft.com/office/drawing/2014/main" id="{463AD1FC-A769-40FA-0291-AA335AEE4251}"/>
+              </a:ext>
+            </a:extLst>
+          </p:cNvPr>
+          <p:cNvPicPr>
+            <a:picLocks noChangeAspect="1"/>
+          </p:cNvPicPr>
+          <p:nvPr/>
+        </p:nvPicPr>
+        <p:blipFill>
+          <a:blip r:embed="rId6"/>
+          <a:stretch>
+            <a:fillRect/>
+          </a:stretch>
+        </p:blipFill>
+        <p:spPr>
+          <a:xfrm>
+            <a:off x="9074837" y="1160039"/>
+            <a:ext cx="2886075" cy="800100"/>
+          </a:xfrm>
+          <a:prstGeom prst="rect">
+            <a:avLst/>
+          </a:prstGeom>
+        </p:spPr>
+      </p:pic>
     </p:spTree>
     <p:extLst>
       <p:ext uri="{BB962C8B-B14F-4D97-AF65-F5344CB8AC3E}">
@@ -16362,7 +16820,7 @@
         </p:nvSpPr>
         <p:spPr>
           <a:xfrm>
-            <a:off x="1730000" y="2065825"/>
+            <a:off x="1934950" y="2055595"/>
             <a:ext cx="4708500" cy="3881700"/>
           </a:xfrm>
           <a:prstGeom prst="rect">
@@ -16397,84 +16855,8 @@
                 <a:solidFill>
                   <a:schemeClr val="bg1"/>
                 </a:solidFill>
-                <a:latin typeface="Lato"/>
-                <a:ea typeface="Lato"/>
-                <a:cs typeface="Lato"/>
-                <a:sym typeface="Lato"/>
               </a:rPr>
-              <a:t>È stata realizzata una modifica </a:t>
-            </a:r>
-            <a:r>
-              <a:rPr lang="it-IT" sz="1800" dirty="0" err="1">
-                <a:solidFill>
-                  <a:schemeClr val="bg1"/>
-                </a:solidFill>
-                <a:latin typeface="Lato"/>
-                <a:ea typeface="Lato"/>
-                <a:cs typeface="Lato"/>
-                <a:sym typeface="Lato"/>
-              </a:rPr>
-              <a:t>alll’interno</a:t>
-            </a:r>
-            <a:r>
-              <a:rPr lang="it-IT" sz="1800" dirty="0">
-                <a:solidFill>
-                  <a:schemeClr val="bg1"/>
-                </a:solidFill>
-                <a:latin typeface="Lato"/>
-                <a:ea typeface="Lato"/>
-                <a:cs typeface="Lato"/>
-                <a:sym typeface="Lato"/>
-              </a:rPr>
-              <a:t> della lambda </a:t>
-            </a:r>
-            <a:r>
-              <a:rPr lang="it-IT" sz="1800" dirty="0" err="1">
-                <a:solidFill>
-                  <a:schemeClr val="bg1"/>
-                </a:solidFill>
-                <a:latin typeface="Lato"/>
-                <a:ea typeface="Lato"/>
-                <a:cs typeface="Lato"/>
-                <a:sym typeface="Lato"/>
-              </a:rPr>
-              <a:t>function</a:t>
-            </a:r>
-            <a:r>
-              <a:rPr lang="it-IT" sz="1800" dirty="0">
-                <a:solidFill>
-                  <a:schemeClr val="bg1"/>
-                </a:solidFill>
-                <a:latin typeface="Lato"/>
-                <a:ea typeface="Lato"/>
-                <a:cs typeface="Lato"/>
-                <a:sym typeface="Lato"/>
-              </a:rPr>
-              <a:t>  </a:t>
-            </a:r>
-            <a:r>
-              <a:rPr lang="it-IT" sz="1800" dirty="0" err="1">
-                <a:solidFill>
-                  <a:schemeClr val="bg1"/>
-                </a:solidFill>
-                <a:latin typeface="Lato"/>
-                <a:ea typeface="Lato"/>
-                <a:cs typeface="Lato"/>
-                <a:sym typeface="Lato"/>
-              </a:rPr>
-              <a:t>getListTalks</a:t>
-            </a:r>
-            <a:r>
-              <a:rPr lang="it-IT" sz="1800" dirty="0">
-                <a:solidFill>
-                  <a:schemeClr val="bg1"/>
-                </a:solidFill>
-                <a:latin typeface="Lato"/>
-                <a:ea typeface="Lato"/>
-                <a:cs typeface="Lato"/>
-                <a:sym typeface="Lato"/>
-              </a:rPr>
-              <a:t> andando a togliere il limite per pagina consentendo così lo scorrimento tra i video della nostra app.</a:t>
+              <a:t>Al lancio dell'applicazione si potrebbe riscontrare una maggiore latenza. </a:t>
             </a:r>
           </a:p>
           <a:p>
@@ -16496,13 +16878,18 @@
                 <a:solidFill>
                   <a:schemeClr val="bg1"/>
                 </a:solidFill>
-                <a:latin typeface="Lato"/>
-                <a:ea typeface="Lato"/>
-                <a:cs typeface="Lato"/>
-                <a:sym typeface="Lato"/>
               </a:rPr>
-              <a:t>Si può rilevare al lancio dell’applicazione una latenza più elevata</a:t>
+              <a:t>A volte la funzione Lambda restituisce errori a causa di problemi con il server, influenzando così l'usabilità dell'applicazione.</a:t>
             </a:r>
+            <a:endParaRPr lang="it-IT" dirty="0">
+              <a:solidFill>
+                <a:schemeClr val="bg1"/>
+              </a:solidFill>
+              <a:latin typeface="Lato"/>
+              <a:ea typeface="Lato"/>
+              <a:cs typeface="Lato"/>
+              <a:sym typeface="Lato"/>
+            </a:endParaRPr>
           </a:p>
         </p:txBody>
       </p:sp>
@@ -18495,6 +18882,143 @@
                 <a:schemeClr val="bg1"/>
               </a:solidFill>
             </a:endParaRPr>
+          </a:p>
+        </p:txBody>
+      </p:sp>
+      <p:pic>
+        <p:nvPicPr>
+          <p:cNvPr id="3" name="Immagine 2" descr="Immagine che contiene testo, schermata, software, schermo&#10;&#10;Descrizione generata automaticamente">
+            <a:extLst>
+              <a:ext uri="{FF2B5EF4-FFF2-40B4-BE49-F238E27FC236}">
+                <a16:creationId xmlns:a16="http://schemas.microsoft.com/office/drawing/2014/main" id="{F8378A34-F63E-6687-B9AF-0F0C4B6E1E8B}"/>
+              </a:ext>
+            </a:extLst>
+          </p:cNvPr>
+          <p:cNvPicPr>
+            <a:picLocks noChangeAspect="1"/>
+          </p:cNvPicPr>
+          <p:nvPr/>
+        </p:nvPicPr>
+        <p:blipFill>
+          <a:blip r:embed="rId3"/>
+          <a:stretch>
+            <a:fillRect/>
+          </a:stretch>
+        </p:blipFill>
+        <p:spPr>
+          <a:xfrm>
+            <a:off x="6865061" y="1502488"/>
+            <a:ext cx="4910631" cy="5144830"/>
+          </a:xfrm>
+          <a:prstGeom prst="rect">
+            <a:avLst/>
+          </a:prstGeom>
+        </p:spPr>
+      </p:pic>
+      <p:pic>
+        <p:nvPicPr>
+          <p:cNvPr id="6" name="Immagine 5" descr="Immagine che contiene testo, schermata, software&#10;&#10;Descrizione generata automaticamente">
+            <a:extLst>
+              <a:ext uri="{FF2B5EF4-FFF2-40B4-BE49-F238E27FC236}">
+                <a16:creationId xmlns:a16="http://schemas.microsoft.com/office/drawing/2014/main" id="{6CF74EE9-B581-91D1-91CA-9C07E638B789}"/>
+              </a:ext>
+            </a:extLst>
+          </p:cNvPr>
+          <p:cNvPicPr>
+            <a:picLocks noChangeAspect="1"/>
+          </p:cNvPicPr>
+          <p:nvPr/>
+        </p:nvPicPr>
+        <p:blipFill rotWithShape="1">
+          <a:blip r:embed="rId4"/>
+          <a:srcRect r="9279"/>
+          <a:stretch/>
+        </p:blipFill>
+        <p:spPr>
+          <a:xfrm>
+            <a:off x="416308" y="2407158"/>
+            <a:ext cx="5903810" cy="4240160"/>
+          </a:xfrm>
+          <a:prstGeom prst="rect">
+            <a:avLst/>
+          </a:prstGeom>
+        </p:spPr>
+      </p:pic>
+      <p:sp>
+        <p:nvSpPr>
+          <p:cNvPr id="7" name="CasellaDiTesto 6">
+            <a:extLst>
+              <a:ext uri="{FF2B5EF4-FFF2-40B4-BE49-F238E27FC236}">
+                <a16:creationId xmlns:a16="http://schemas.microsoft.com/office/drawing/2014/main" id="{EC168B2F-8DAA-A857-A144-97DE029AB9B6}"/>
+              </a:ext>
+            </a:extLst>
+          </p:cNvPr>
+          <p:cNvSpPr txBox="1"/>
+          <p:nvPr/>
+        </p:nvSpPr>
+        <p:spPr>
+          <a:xfrm>
+            <a:off x="416308" y="1964090"/>
+            <a:ext cx="4007223" cy="307777"/>
+          </a:xfrm>
+          <a:prstGeom prst="rect">
+            <a:avLst/>
+          </a:prstGeom>
+          <a:noFill/>
+        </p:spPr>
+        <p:txBody>
+          <a:bodyPr wrap="square" rtlCol="0">
+            <a:spAutoFit/>
+          </a:bodyPr>
+          <a:lstStyle/>
+          <a:p>
+            <a:r>
+              <a:rPr lang="it-IT" dirty="0">
+                <a:solidFill>
+                  <a:schemeClr val="bg1"/>
+                </a:solidFill>
+              </a:rPr>
+              <a:t>Funzione che permette la chiamata dell’API</a:t>
+            </a:r>
+          </a:p>
+        </p:txBody>
+      </p:sp>
+      <p:sp>
+        <p:nvSpPr>
+          <p:cNvPr id="8" name="CasellaDiTesto 7">
+            <a:extLst>
+              <a:ext uri="{FF2B5EF4-FFF2-40B4-BE49-F238E27FC236}">
+                <a16:creationId xmlns:a16="http://schemas.microsoft.com/office/drawing/2014/main" id="{7648994F-0652-04A8-AEC7-767121AB7E99}"/>
+              </a:ext>
+            </a:extLst>
+          </p:cNvPr>
+          <p:cNvSpPr txBox="1"/>
+          <p:nvPr/>
+        </p:nvSpPr>
+        <p:spPr>
+          <a:xfrm>
+            <a:off x="7382435" y="770972"/>
+            <a:ext cx="4087906" cy="738664"/>
+          </a:xfrm>
+          <a:prstGeom prst="rect">
+            <a:avLst/>
+          </a:prstGeom>
+          <a:noFill/>
+        </p:spPr>
+        <p:txBody>
+          <a:bodyPr wrap="square" rtlCol="0">
+            <a:spAutoFit/>
+          </a:bodyPr>
+          <a:lstStyle/>
+          <a:p>
+            <a:r>
+              <a:rPr lang="it-IT" dirty="0">
+                <a:solidFill>
+                  <a:schemeClr val="bg1"/>
+                </a:solidFill>
+              </a:rPr>
+              <a:t>Funzione che permette dato un URL di TED di creare una pagina HTML per la visualizzazione del video</a:t>
+            </a:r>
           </a:p>
         </p:txBody>
       </p:sp>

</xml_diff>